<commit_message>
modified banner and reserach pics
</commit_message>
<xml_diff>
--- a/img/research_foci/BloomSail.pptx
+++ b/img/research_foci/BloomSail.pptx
@@ -212,7 +212,7 @@
           <a:p>
             <a:fld id="{55297F81-B288-40C8-95B1-F597D2500F01}" type="datetimeFigureOut">
               <a:rPr lang="en-US" smtClean="0"/>
-              <a:t>26-Oct-19</a:t>
+              <a:t>29-Oct-19</a:t>
             </a:fld>
             <a:endParaRPr lang="en-US"/>
           </a:p>
@@ -802,7 +802,7 @@
           <a:p>
             <a:fld id="{0AFEA8D4-8C0D-435D-8B26-066215F25AC7}" type="datetimeFigureOut">
               <a:rPr lang="en-US" smtClean="0"/>
-              <a:t>26-Oct-19</a:t>
+              <a:t>29-Oct-19</a:t>
             </a:fld>
             <a:endParaRPr lang="en-US"/>
           </a:p>
@@ -972,7 +972,7 @@
           <a:p>
             <a:fld id="{0AFEA8D4-8C0D-435D-8B26-066215F25AC7}" type="datetimeFigureOut">
               <a:rPr lang="en-US" smtClean="0"/>
-              <a:t>26-Oct-19</a:t>
+              <a:t>29-Oct-19</a:t>
             </a:fld>
             <a:endParaRPr lang="en-US"/>
           </a:p>
@@ -1152,7 +1152,7 @@
           <a:p>
             <a:fld id="{0AFEA8D4-8C0D-435D-8B26-066215F25AC7}" type="datetimeFigureOut">
               <a:rPr lang="en-US" smtClean="0"/>
-              <a:t>26-Oct-19</a:t>
+              <a:t>29-Oct-19</a:t>
             </a:fld>
             <a:endParaRPr lang="en-US"/>
           </a:p>
@@ -1322,7 +1322,7 @@
           <a:p>
             <a:fld id="{0AFEA8D4-8C0D-435D-8B26-066215F25AC7}" type="datetimeFigureOut">
               <a:rPr lang="en-US" smtClean="0"/>
-              <a:t>26-Oct-19</a:t>
+              <a:t>29-Oct-19</a:t>
             </a:fld>
             <a:endParaRPr lang="en-US"/>
           </a:p>
@@ -1568,7 +1568,7 @@
           <a:p>
             <a:fld id="{0AFEA8D4-8C0D-435D-8B26-066215F25AC7}" type="datetimeFigureOut">
               <a:rPr lang="en-US" smtClean="0"/>
-              <a:t>26-Oct-19</a:t>
+              <a:t>29-Oct-19</a:t>
             </a:fld>
             <a:endParaRPr lang="en-US"/>
           </a:p>
@@ -1800,7 +1800,7 @@
           <a:p>
             <a:fld id="{0AFEA8D4-8C0D-435D-8B26-066215F25AC7}" type="datetimeFigureOut">
               <a:rPr lang="en-US" smtClean="0"/>
-              <a:t>26-Oct-19</a:t>
+              <a:t>29-Oct-19</a:t>
             </a:fld>
             <a:endParaRPr lang="en-US"/>
           </a:p>
@@ -2167,7 +2167,7 @@
           <a:p>
             <a:fld id="{0AFEA8D4-8C0D-435D-8B26-066215F25AC7}" type="datetimeFigureOut">
               <a:rPr lang="en-US" smtClean="0"/>
-              <a:t>26-Oct-19</a:t>
+              <a:t>29-Oct-19</a:t>
             </a:fld>
             <a:endParaRPr lang="en-US"/>
           </a:p>
@@ -2285,7 +2285,7 @@
           <a:p>
             <a:fld id="{0AFEA8D4-8C0D-435D-8B26-066215F25AC7}" type="datetimeFigureOut">
               <a:rPr lang="en-US" smtClean="0"/>
-              <a:t>26-Oct-19</a:t>
+              <a:t>29-Oct-19</a:t>
             </a:fld>
             <a:endParaRPr lang="en-US"/>
           </a:p>
@@ -2380,7 +2380,7 @@
           <a:p>
             <a:fld id="{0AFEA8D4-8C0D-435D-8B26-066215F25AC7}" type="datetimeFigureOut">
               <a:rPr lang="en-US" smtClean="0"/>
-              <a:t>26-Oct-19</a:t>
+              <a:t>29-Oct-19</a:t>
             </a:fld>
             <a:endParaRPr lang="en-US"/>
           </a:p>
@@ -2657,7 +2657,7 @@
           <a:p>
             <a:fld id="{0AFEA8D4-8C0D-435D-8B26-066215F25AC7}" type="datetimeFigureOut">
               <a:rPr lang="en-US" smtClean="0"/>
-              <a:t>26-Oct-19</a:t>
+              <a:t>29-Oct-19</a:t>
             </a:fld>
             <a:endParaRPr lang="en-US"/>
           </a:p>
@@ -2914,7 +2914,7 @@
           <a:p>
             <a:fld id="{0AFEA8D4-8C0D-435D-8B26-066215F25AC7}" type="datetimeFigureOut">
               <a:rPr lang="en-US" smtClean="0"/>
-              <a:t>26-Oct-19</a:t>
+              <a:t>29-Oct-19</a:t>
             </a:fld>
             <a:endParaRPr lang="en-US"/>
           </a:p>
@@ -3127,7 +3127,7 @@
           <a:p>
             <a:fld id="{0AFEA8D4-8C0D-435D-8B26-066215F25AC7}" type="datetimeFigureOut">
               <a:rPr lang="en-US" smtClean="0"/>
-              <a:t>26-Oct-19</a:t>
+              <a:t>29-Oct-19</a:t>
             </a:fld>
             <a:endParaRPr lang="en-US"/>
           </a:p>
@@ -3532,81 +3532,6 @@
           <a:chExt cx="0" cy="0"/>
         </a:xfrm>
       </p:grpSpPr>
-      <p:sp>
-        <p:nvSpPr>
-          <p:cNvPr id="16" name="Rechteck 15"/>
-          <p:cNvSpPr/>
-          <p:nvPr/>
-        </p:nvSpPr>
-        <p:spPr>
-          <a:xfrm>
-            <a:off x="1758308" y="895532"/>
-            <a:ext cx="7083767" cy="707886"/>
-          </a:xfrm>
-          <a:prstGeom prst="rect">
-            <a:avLst/>
-          </a:prstGeom>
-          <a:solidFill>
-            <a:schemeClr val="bg2"/>
-          </a:solidFill>
-          <a:effectLst>
-            <a:outerShdw blurRad="50800" dist="38100" dir="2700000" algn="tl" rotWithShape="0">
-              <a:prstClr val="black">
-                <a:alpha val="40000"/>
-              </a:prstClr>
-            </a:outerShdw>
-          </a:effectLst>
-        </p:spPr>
-        <p:txBody>
-          <a:bodyPr wrap="square">
-            <a:spAutoFit/>
-          </a:bodyPr>
-          <a:lstStyle/>
-          <a:p>
-            <a:pPr algn="ctr"/>
-            <a:r>
-              <a:rPr lang="de-DE" sz="2000" smtClean="0">
-                <a:latin typeface="Arial" panose="020B0604020202020204" pitchFamily="34" charset="0"/>
-                <a:ea typeface="Times New Roman" panose="02020603050405020304" pitchFamily="18" charset="0"/>
-                <a:cs typeface="Arial" panose="020B0604020202020204" pitchFamily="34" charset="0"/>
-              </a:rPr>
-              <a:t>Three months right in the middle of a cyanobacteria bloom…</a:t>
-            </a:r>
-          </a:p>
-          <a:p>
-            <a:pPr algn="ctr"/>
-            <a:r>
-              <a:rPr lang="de-DE" sz="2000" smtClean="0">
-                <a:latin typeface="Arial" panose="020B0604020202020204" pitchFamily="34" charset="0"/>
-                <a:ea typeface="Times New Roman" panose="02020603050405020304" pitchFamily="18" charset="0"/>
-                <a:cs typeface="Arial" panose="020B0604020202020204" pitchFamily="34" charset="0"/>
-              </a:rPr>
-              <a:t>… with a sailing vessel and a submersible pCO</a:t>
-            </a:r>
-            <a:r>
-              <a:rPr lang="de-DE" sz="2000" baseline="-25000" smtClean="0">
-                <a:latin typeface="Arial" panose="020B0604020202020204" pitchFamily="34" charset="0"/>
-                <a:ea typeface="Times New Roman" panose="02020603050405020304" pitchFamily="18" charset="0"/>
-                <a:cs typeface="Arial" panose="020B0604020202020204" pitchFamily="34" charset="0"/>
-              </a:rPr>
-              <a:t>2</a:t>
-            </a:r>
-            <a:r>
-              <a:rPr lang="de-DE" sz="2000" smtClean="0">
-                <a:latin typeface="Arial" panose="020B0604020202020204" pitchFamily="34" charset="0"/>
-                <a:ea typeface="Times New Roman" panose="02020603050405020304" pitchFamily="18" charset="0"/>
-                <a:cs typeface="Arial" panose="020B0604020202020204" pitchFamily="34" charset="0"/>
-              </a:rPr>
-              <a:t>-sensor!</a:t>
-            </a:r>
-            <a:endParaRPr lang="en-US" sz="2000">
-              <a:latin typeface="Arial" panose="020B0604020202020204" pitchFamily="34" charset="0"/>
-              <a:ea typeface="Times New Roman" panose="02020603050405020304" pitchFamily="18" charset="0"/>
-              <a:cs typeface="Arial" panose="020B0604020202020204" pitchFamily="34" charset="0"/>
-            </a:endParaRPr>
-          </a:p>
-        </p:txBody>
-      </p:sp>
       <p:pic>
         <p:nvPicPr>
           <p:cNvPr id="2" name="Grafik 1"/>
@@ -3803,83 +3728,9 @@
   <p:timing>
     <p:tnLst>
       <p:par>
-        <p:cTn id="1" dur="indefinite" restart="never" nodeType="tmRoot">
-          <p:childTnLst>
-            <p:seq concurrent="1" nextAc="seek">
-              <p:cTn id="2" dur="indefinite" nodeType="mainSeq">
-                <p:childTnLst>
-                  <p:par>
-                    <p:cTn id="3" fill="hold">
-                      <p:stCondLst>
-                        <p:cond delay="indefinite"/>
-                        <p:cond evt="onBegin" delay="0">
-                          <p:tn val="2"/>
-                        </p:cond>
-                      </p:stCondLst>
-                      <p:childTnLst>
-                        <p:par>
-                          <p:cTn id="4" fill="hold">
-                            <p:stCondLst>
-                              <p:cond delay="0"/>
-                            </p:stCondLst>
-                            <p:childTnLst>
-                              <p:par>
-                                <p:cTn id="5" presetID="1" presetClass="entr" presetSubtype="0" fill="hold" grpId="0" nodeType="withEffect">
-                                  <p:stCondLst>
-                                    <p:cond delay="0"/>
-                                  </p:stCondLst>
-                                  <p:childTnLst>
-                                    <p:set>
-                                      <p:cBhvr>
-                                        <p:cTn id="6" dur="1" fill="hold">
-                                          <p:stCondLst>
-                                            <p:cond delay="0"/>
-                                          </p:stCondLst>
-                                        </p:cTn>
-                                        <p:tgtEl>
-                                          <p:spTgt spid="16"/>
-                                        </p:tgtEl>
-                                        <p:attrNameLst>
-                                          <p:attrName>style.visibility</p:attrName>
-                                        </p:attrNameLst>
-                                      </p:cBhvr>
-                                      <p:to>
-                                        <p:strVal val="visible"/>
-                                      </p:to>
-                                    </p:set>
-                                  </p:childTnLst>
-                                </p:cTn>
-                              </p:par>
-                            </p:childTnLst>
-                          </p:cTn>
-                        </p:par>
-                      </p:childTnLst>
-                    </p:cTn>
-                  </p:par>
-                </p:childTnLst>
-              </p:cTn>
-              <p:prevCondLst>
-                <p:cond evt="onPrev" delay="0">
-                  <p:tgtEl>
-                    <p:sldTgt/>
-                  </p:tgtEl>
-                </p:cond>
-              </p:prevCondLst>
-              <p:nextCondLst>
-                <p:cond evt="onNext" delay="0">
-                  <p:tgtEl>
-                    <p:sldTgt/>
-                  </p:tgtEl>
-                </p:cond>
-              </p:nextCondLst>
-            </p:seq>
-          </p:childTnLst>
-        </p:cTn>
+        <p:cTn id="1" dur="indefinite" restart="never" nodeType="tmRoot"/>
       </p:par>
     </p:tnLst>
-    <p:bldLst>
-      <p:bldP spid="16" grpId="0" animBg="1"/>
-    </p:bldLst>
   </p:timing>
 </p:sld>
 </file>

</xml_diff>